<commit_message>
first version of lecture 1
</commit_message>
<xml_diff>
--- a/assets/lectures/PMBIO_ModuleXX_Template.pptx
+++ b/assets/lectures/PMBIO_ModuleXX_Template.pptx
@@ -115,7 +115,7 @@
   </p:defaultTextStyle>
   <p:extLst>
     <p:ext uri="{EFAFB233-063F-42B5-8137-9DF3F51BA10A}">
-      <p15:sldGuideLst xmlns="" xmlns:p15="http://schemas.microsoft.com/office/powerpoint/2012/main">
+      <p15:sldGuideLst xmlns:p15="http://schemas.microsoft.com/office/powerpoint/2012/main" xmlns="">
         <p15:guide id="1" orient="horz" pos="2160">
           <p15:clr>
             <a:srgbClr val="A4A3A4"/>
@@ -215,7 +215,7 @@
             <a:fld id="{03643E35-CD80-874A-A3D7-254E954BB753}" type="datetimeFigureOut">
               <a:rPr lang="en-US" smtClean="0"/>
               <a:pPr/>
-              <a:t>9/28/18</a:t>
+              <a:t>10/19/18</a:t>
             </a:fld>
             <a:endParaRPr lang="en-US"/>
           </a:p>
@@ -382,7 +382,7 @@
             <a:fld id="{5C416C15-7665-174C-99B8-5B237ACA6582}" type="datetimeFigureOut">
               <a:rPr lang="en-US" smtClean="0"/>
               <a:pPr/>
-              <a:t>9/28/18</a:t>
+              <a:t>10/19/18</a:t>
             </a:fld>
             <a:endParaRPr lang="en-US"/>
           </a:p>
@@ -2946,10 +2946,6 @@
               <a:rPr lang="en-US" dirty="0" smtClean="0"/>
               <a:t>PMBIO Module XX:</a:t>
             </a:r>
-            <a:r>
-              <a:rPr lang="en-US" dirty="0" smtClean="0"/>
-              <a:t/>
-            </a:r>
             <a:br>
               <a:rPr lang="en-US" dirty="0" smtClean="0"/>
             </a:br>
@@ -2986,19 +2982,7 @@
             <a:pPr algn="r"/>
             <a:r>
               <a:rPr lang="en-US" sz="1800" dirty="0" smtClean="0"/>
-              <a:t>Malachi Griffith, </a:t>
-            </a:r>
-            <a:r>
-              <a:rPr lang="en-US" sz="1800" dirty="0" smtClean="0"/>
-              <a:t>Obi </a:t>
-            </a:r>
-            <a:r>
-              <a:rPr lang="en-US" sz="1800" dirty="0" smtClean="0"/>
-              <a:t>Griffith, Zachary </a:t>
-            </a:r>
-            <a:r>
-              <a:rPr lang="en-US" sz="1800" dirty="0" smtClean="0"/>
-              <a:t>Skidmore, </a:t>
+              <a:t>Malachi Griffith, Obi Griffith, Zachary Skidmore, </a:t>
             </a:r>
             <a:r>
               <a:rPr lang="en-US" sz="1800" dirty="0" err="1" smtClean="0"/>
@@ -3008,7 +2992,6 @@
               <a:rPr lang="en-US" sz="1800" dirty="0" smtClean="0"/>
               <a:t> Xia</a:t>
             </a:r>
-            <a:endParaRPr lang="en-US" sz="1800" dirty="0" smtClean="0"/>
           </a:p>
           <a:p>
             <a:pPr algn="r"/>
@@ -3115,6 +3098,36 @@
           <a:xfrm>
             <a:off x="68852" y="-7633"/>
             <a:ext cx="9075148" cy="2869918"/>
+          </a:xfrm>
+          <a:prstGeom prst="rect">
+            <a:avLst/>
+          </a:prstGeom>
+        </p:spPr>
+      </p:pic>
+      <p:pic>
+        <p:nvPicPr>
+          <p:cNvPr id="7" name="Picture 6" descr="School_of_Medicine_2linehrz_pos(RGB)1000-01.png"/>
+          <p:cNvPicPr>
+            <a:picLocks noChangeAspect="1"/>
+          </p:cNvPicPr>
+          <p:nvPr/>
+        </p:nvPicPr>
+        <p:blipFill>
+          <a:blip r:embed="rId4">
+            <a:extLst>
+              <a:ext uri="{28A0092B-C50C-407E-A947-70E740481C1C}">
+                <a14:useLocalDpi xmlns:a14="http://schemas.microsoft.com/office/drawing/2010/main" val="0"/>
+              </a:ext>
+            </a:extLst>
+          </a:blip>
+          <a:stretch>
+            <a:fillRect/>
+          </a:stretch>
+        </p:blipFill>
+        <p:spPr>
+          <a:xfrm>
+            <a:off x="468529" y="5339052"/>
+            <a:ext cx="2588276" cy="1414140"/>
           </a:xfrm>
           <a:prstGeom prst="rect">
             <a:avLst/>
@@ -3444,7 +3457,6 @@
               <a:rPr lang="en-US" dirty="0" smtClean="0"/>
               <a:t>MODULE TITLE</a:t>
             </a:r>
-            <a:endParaRPr lang="en-US" dirty="0" smtClean="0"/>
           </a:p>
           <a:p>
             <a:pPr lvl="1"/>
@@ -3740,7 +3752,7 @@
   <a:extraClrSchemeLst/>
   <a:extLst>
     <a:ext uri="{05A4C25C-085E-4340-85A3-A5531E510DB2}">
-      <thm15:themeFamily xmlns="" xmlns:thm15="http://schemas.microsoft.com/office/thememl/2012/main" name="MGI_4-3_ratio_v1a" id="{9A0171FA-20F4-F840-B1C8-29D686AB0540}" vid="{60506783-C923-7847-B1CA-7C860CC95497}"/>
+      <thm15:themeFamily xmlns:thm15="http://schemas.microsoft.com/office/thememl/2012/main" xmlns="" name="MGI_4-3_ratio_v1a" id="{9A0171FA-20F4-F840-B1C8-29D686AB0540}" vid="{60506783-C923-7847-B1CA-7C860CC95497}"/>
     </a:ext>
   </a:extLst>
 </a:theme>

</xml_diff>